<commit_message>
Add final slide with links to code
</commit_message>
<xml_diff>
--- a/Presentations/AI_Immersion_Phase_1_DocumentDB.pptx
+++ b/Presentations/AI_Immersion_Phase_1_DocumentDB.pptx
@@ -5,10 +5,10 @@
     <p:sldMasterId id="2147484229" r:id="rId4"/>
   </p:sldMasterIdLst>
   <p:notesMasterIdLst>
-    <p:notesMasterId r:id="rId21"/>
+    <p:notesMasterId r:id="rId22"/>
   </p:notesMasterIdLst>
   <p:handoutMasterIdLst>
-    <p:handoutMasterId r:id="rId22"/>
+    <p:handoutMasterId r:id="rId23"/>
   </p:handoutMasterIdLst>
   <p:sldIdLst>
     <p:sldId id="1485" r:id="rId5"/>
@@ -27,6 +27,7 @@
     <p:sldId id="1530" r:id="rId18"/>
     <p:sldId id="1546" r:id="rId19"/>
     <p:sldId id="1532" r:id="rId20"/>
+    <p:sldId id="1548" r:id="rId21"/>
   </p:sldIdLst>
   <p:sldSz cx="12436475" cy="6994525"/>
   <p:notesSz cx="6858000" cy="9144000"/>
@@ -146,6 +147,7 @@
             <p14:sldId id="1530"/>
             <p14:sldId id="1546"/>
             <p14:sldId id="1532"/>
+            <p14:sldId id="1548"/>
           </p14:sldIdLst>
         </p14:section>
       </p14:sectionLst>
@@ -285,7 +287,7 @@
               <a:rPr lang="en-US" smtClean="0">
                 <a:latin typeface="Segoe UI" pitchFamily="34" charset="0"/>
               </a:rPr>
-              <a:t>5/7/2017 9:21 PM</a:t>
+              <a:t>5/9/2017 9:19 AM</a:t>
             </a:fld>
             <a:endParaRPr lang="en-US" dirty="0">
               <a:latin typeface="Segoe UI" pitchFamily="34" charset="0"/>
@@ -582,7 +584,7 @@
           <a:p>
             <a:fld id="{D18B56EA-E28F-4F92-9F16-7A6F2501B303}" type="datetime8">
               <a:rPr lang="en-US" smtClean="0"/>
-              <a:t>5/7/2017 5:31 PM</a:t>
+              <a:t>5/9/2017 9:09 AM</a:t>
             </a:fld>
             <a:endParaRPr lang="en-US" dirty="0"/>
           </a:p>
@@ -968,7 +970,7 @@
           <a:p>
             <a:fld id="{88B44C4B-E218-4158-810E-47EF8FD635FD}" type="datetime8">
               <a:rPr lang="en-US" smtClean="0"/>
-              <a:t>5/7/2017 5:31 PM</a:t>
+              <a:t>5/9/2017 9:09 AM</a:t>
             </a:fld>
             <a:endParaRPr lang="en-US" dirty="0"/>
           </a:p>
@@ -1121,7 +1123,7 @@
                   <a:prstClr val="black"/>
                 </a:solidFill>
               </a:rPr>
-              <a:t>5/7/2017 5:31 PM</a:t>
+              <a:t>5/9/2017 9:09 AM</a:t>
             </a:fld>
             <a:endParaRPr lang="en-US" dirty="0">
               <a:solidFill>
@@ -1205,6 +1207,187 @@
     <p:extLst>
       <p:ext uri="{BB962C8B-B14F-4D97-AF65-F5344CB8AC3E}">
         <p14:creationId xmlns:p14="http://schemas.microsoft.com/office/powerpoint/2010/main" val="2185510719"/>
+      </p:ext>
+    </p:extLst>
+  </p:cSld>
+  <p:clrMapOvr>
+    <a:masterClrMapping/>
+  </p:clrMapOvr>
+</p:notes>
+</file>
+
+<file path=ppt/notesSlides/notesSlide11.xml><?xml version="1.0" encoding="utf-8"?>
+<p:notes xmlns:a="http://schemas.openxmlformats.org/drawingml/2006/main" xmlns:r="http://schemas.openxmlformats.org/officeDocument/2006/relationships" xmlns:p="http://schemas.openxmlformats.org/presentationml/2006/main">
+  <p:cSld>
+    <p:spTree>
+      <p:nvGrpSpPr>
+        <p:cNvPr id="1" name=""/>
+        <p:cNvGrpSpPr/>
+        <p:nvPr/>
+      </p:nvGrpSpPr>
+      <p:grpSpPr>
+        <a:xfrm>
+          <a:off x="0" y="0"/>
+          <a:ext cx="0" cy="0"/>
+          <a:chOff x="0" y="0"/>
+          <a:chExt cx="0" cy="0"/>
+        </a:xfrm>
+      </p:grpSpPr>
+      <p:sp>
+        <p:nvSpPr>
+          <p:cNvPr id="2" name="Slide Image Placeholder 1"/>
+          <p:cNvSpPr>
+            <a:spLocks noGrp="1" noRot="1" noChangeAspect="1"/>
+          </p:cNvSpPr>
+          <p:nvPr>
+            <p:ph type="sldImg"/>
+          </p:nvPr>
+        </p:nvSpPr>
+        <p:spPr/>
+      </p:sp>
+      <p:sp>
+        <p:nvSpPr>
+          <p:cNvPr id="3" name="Notes Placeholder 2"/>
+          <p:cNvSpPr>
+            <a:spLocks noGrp="1"/>
+          </p:cNvSpPr>
+          <p:nvPr>
+            <p:ph type="body" idx="1"/>
+          </p:nvPr>
+        </p:nvSpPr>
+        <p:spPr/>
+        <p:txBody>
+          <a:bodyPr/>
+          <a:lstStyle/>
+          <a:p>
+            <a:endParaRPr lang="en-US" dirty="0"/>
+          </a:p>
+        </p:txBody>
+      </p:sp>
+      <p:sp>
+        <p:nvSpPr>
+          <p:cNvPr id="6" name="Slide Number Placeholder 5"/>
+          <p:cNvSpPr>
+            <a:spLocks noGrp="1"/>
+          </p:cNvSpPr>
+          <p:nvPr>
+            <p:ph type="sldNum" sz="quarter" idx="12"/>
+          </p:nvPr>
+        </p:nvSpPr>
+        <p:spPr/>
+        <p:txBody>
+          <a:bodyPr/>
+          <a:lstStyle/>
+          <a:p>
+            <a:fld id="{B4008EB6-D09E-4580-8CD6-DDB14511944F}" type="slidenum">
+              <a:rPr lang="en-US" smtClean="0"/>
+              <a:pPr/>
+              <a:t>17</a:t>
+            </a:fld>
+            <a:endParaRPr lang="en-US" dirty="0"/>
+          </a:p>
+        </p:txBody>
+      </p:sp>
+      <p:sp>
+        <p:nvSpPr>
+          <p:cNvPr id="10" name="Date Placeholder 9"/>
+          <p:cNvSpPr>
+            <a:spLocks noGrp="1"/>
+          </p:cNvSpPr>
+          <p:nvPr>
+            <p:ph type="dt" idx="13"/>
+          </p:nvPr>
+        </p:nvSpPr>
+        <p:spPr/>
+        <p:txBody>
+          <a:bodyPr/>
+          <a:lstStyle/>
+          <a:p>
+            <a:fld id="{5A70A388-5CB4-42F2-85B9-1AE1F63398FA}" type="datetime8">
+              <a:rPr lang="en-US" smtClean="0"/>
+              <a:t>5/9/2017 9:19 AM</a:t>
+            </a:fld>
+            <a:endParaRPr lang="en-US" dirty="0"/>
+          </a:p>
+        </p:txBody>
+      </p:sp>
+      <p:sp>
+        <p:nvSpPr>
+          <p:cNvPr id="12" name="Header Placeholder 11"/>
+          <p:cNvSpPr>
+            <a:spLocks noGrp="1"/>
+          </p:cNvSpPr>
+          <p:nvPr>
+            <p:ph type="hdr" sz="quarter" idx="15"/>
+          </p:nvPr>
+        </p:nvSpPr>
+        <p:spPr/>
+        <p:txBody>
+          <a:bodyPr/>
+          <a:lstStyle/>
+          <a:p>
+            <a:endParaRPr lang="en-US" dirty="0"/>
+          </a:p>
+        </p:txBody>
+      </p:sp>
+      <p:sp>
+        <p:nvSpPr>
+          <p:cNvPr id="5" name="Footer Placeholder 4"/>
+          <p:cNvSpPr>
+            <a:spLocks noGrp="1"/>
+          </p:cNvSpPr>
+          <p:nvPr>
+            <p:ph type="ftr" sz="quarter" idx="16"/>
+          </p:nvPr>
+        </p:nvSpPr>
+        <p:spPr/>
+        <p:txBody>
+          <a:bodyPr/>
+          <a:lstStyle/>
+          <a:p>
+            <a:pPr defTabSz="914099" eaLnBrk="0" hangingPunct="0"/>
+            <a:r>
+              <a:rPr lang="en-US" sz="400">
+                <a:gradFill>
+                  <a:gsLst>
+                    <a:gs pos="0">
+                      <a:prstClr val="black"/>
+                    </a:gs>
+                    <a:gs pos="100000">
+                      <a:prstClr val="black"/>
+                    </a:gs>
+                  </a:gsLst>
+                  <a:lin ang="5400000" scaled="0"/>
+                </a:gradFill>
+                <a:latin typeface="Segoe UI" pitchFamily="34" charset="0"/>
+                <a:ea typeface="Segoe UI" pitchFamily="34" charset="0"/>
+                <a:cs typeface="Segoe UI" pitchFamily="34" charset="0"/>
+              </a:rPr>
+              <a:t>© Microsoft Corporation. All rights reserved. MICROSOFT MAKES NO WARRANTIES, EXPRESS, IMPLIED OR STATUTORY, AS TO THE INFORMATION IN THIS PRESENTATION.</a:t>
+            </a:r>
+            <a:endParaRPr lang="en-US" sz="400" dirty="0">
+              <a:gradFill>
+                <a:gsLst>
+                  <a:gs pos="0">
+                    <a:prstClr val="black"/>
+                  </a:gs>
+                  <a:gs pos="100000">
+                    <a:prstClr val="black"/>
+                  </a:gs>
+                </a:gsLst>
+                <a:lin ang="5400000" scaled="0"/>
+              </a:gradFill>
+              <a:latin typeface="Segoe UI" pitchFamily="34" charset="0"/>
+              <a:ea typeface="Segoe UI" pitchFamily="34" charset="0"/>
+              <a:cs typeface="Segoe UI" pitchFamily="34" charset="0"/>
+            </a:endParaRPr>
+          </a:p>
+        </p:txBody>
+      </p:sp>
+    </p:spTree>
+    <p:extLst>
+      <p:ext uri="{BB962C8B-B14F-4D97-AF65-F5344CB8AC3E}">
+        <p14:creationId xmlns:p14="http://schemas.microsoft.com/office/powerpoint/2010/main" val="1839841998"/>
       </p:ext>
     </p:extLst>
   </p:cSld>
@@ -1355,7 +1538,7 @@
           <a:p>
             <a:fld id="{8683C9CD-37C6-4B53-B210-CC8F66F90493}" type="datetime8">
               <a:rPr lang="en-US" smtClean="0"/>
-              <a:t>5/7/2017 5:31 PM</a:t>
+              <a:t>5/9/2017 9:09 AM</a:t>
             </a:fld>
             <a:endParaRPr lang="en-US" dirty="0"/>
           </a:p>
@@ -1536,7 +1719,7 @@
           <a:p>
             <a:fld id="{38EEC551-8CDA-4EB6-89BB-2A86C9F091C8}" type="datetime8">
               <a:rPr lang="en-US" smtClean="0"/>
-              <a:t>5/7/2017 5:31 PM</a:t>
+              <a:t>5/9/2017 9:09 AM</a:t>
             </a:fld>
             <a:endParaRPr lang="en-US" dirty="0"/>
           </a:p>
@@ -1773,7 +1956,7 @@
                 <a:tabLst/>
                 <a:defRPr/>
               </a:pPr>
-              <a:t>5/7/2017</a:t>
+              <a:t>5/9/2017</a:t>
             </a:fld>
             <a:endParaRPr kumimoji="0" lang="en-US" sz="1800" b="0" i="0" u="none" strike="noStrike" kern="0" cap="none" spc="0" normalizeH="0" baseline="0" noProof="0" dirty="0">
               <a:ln>
@@ -2357,7 +2540,7 @@
           <a:p>
             <a:fld id="{627F603A-779F-4101-9B83-C34650C566A7}" type="datetime8">
               <a:rPr lang="en-US" smtClean="0"/>
-              <a:t>5/7/2017 5:31 PM</a:t>
+              <a:t>5/9/2017 9:09 AM</a:t>
             </a:fld>
             <a:endParaRPr lang="en-US" dirty="0"/>
           </a:p>
@@ -2489,7 +2672,7 @@
           <a:p>
             <a:fld id="{E45DD59A-D9AD-4C82-9DE1-A42A8DB4D1E1}" type="datetime8">
               <a:rPr lang="en-US" smtClean="0"/>
-              <a:t>5/7/2017 5:31 PM</a:t>
+              <a:t>5/9/2017 9:09 AM</a:t>
             </a:fld>
             <a:endParaRPr lang="en-US" dirty="0"/>
           </a:p>
@@ -2673,7 +2856,7 @@
           <a:p>
             <a:fld id="{E45DD59A-D9AD-4C82-9DE1-A42A8DB4D1E1}" type="datetime8">
               <a:rPr lang="en-US" smtClean="0"/>
-              <a:t>5/7/2017 5:31 PM</a:t>
+              <a:t>5/9/2017 9:09 AM</a:t>
             </a:fld>
             <a:endParaRPr lang="en-US" dirty="0"/>
           </a:p>
@@ -5696,7 +5879,7 @@
           <a:p>
             <a:fld id="{9912175C-3CF6-487A-9684-5B9CA6422935}" type="datetimeFigureOut">
               <a:rPr lang="en-US" smtClean="0"/>
-              <a:t>5/7/2017</a:t>
+              <a:t>5/9/2017</a:t>
             </a:fld>
             <a:endParaRPr lang="en-US"/>
           </a:p>
@@ -21131,6 +21314,173 @@
 </p:sld>
 </file>
 
+<file path=ppt/slides/slide17.xml><?xml version="1.0" encoding="utf-8"?>
+<p:sld xmlns:a="http://schemas.openxmlformats.org/drawingml/2006/main" xmlns:r="http://schemas.openxmlformats.org/officeDocument/2006/relationships" xmlns:p="http://schemas.openxmlformats.org/presentationml/2006/main">
+  <p:cSld>
+    <p:spTree>
+      <p:nvGrpSpPr>
+        <p:cNvPr id="1" name=""/>
+        <p:cNvGrpSpPr/>
+        <p:nvPr/>
+      </p:nvGrpSpPr>
+      <p:grpSpPr>
+        <a:xfrm>
+          <a:off x="0" y="0"/>
+          <a:ext cx="0" cy="0"/>
+          <a:chOff x="0" y="0"/>
+          <a:chExt cx="0" cy="0"/>
+        </a:xfrm>
+      </p:grpSpPr>
+      <p:sp>
+        <p:nvSpPr>
+          <p:cNvPr id="17" name="Title 16"/>
+          <p:cNvSpPr>
+            <a:spLocks noGrp="1"/>
+          </p:cNvSpPr>
+          <p:nvPr>
+            <p:ph type="title"/>
+          </p:nvPr>
+        </p:nvSpPr>
+        <p:spPr/>
+        <p:txBody>
+          <a:bodyPr/>
+          <a:lstStyle/>
+          <a:p>
+            <a:r>
+              <a:rPr lang="en-US" dirty="0"/>
+              <a:t>Setup</a:t>
+            </a:r>
+          </a:p>
+        </p:txBody>
+      </p:sp>
+      <p:sp>
+        <p:nvSpPr>
+          <p:cNvPr id="6" name="Text Placeholder 5"/>
+          <p:cNvSpPr>
+            <a:spLocks noGrp="1"/>
+          </p:cNvSpPr>
+          <p:nvPr>
+            <p:ph type="body" sz="quarter" idx="10"/>
+          </p:nvPr>
+        </p:nvSpPr>
+        <p:spPr>
+          <a:xfrm>
+            <a:off x="274702" y="1058862"/>
+            <a:ext cx="11888787" cy="5860066"/>
+          </a:xfrm>
+        </p:spPr>
+        <p:txBody>
+          <a:bodyPr/>
+          <a:lstStyle/>
+          <a:p>
+            <a:r>
+              <a:rPr lang="en-US" dirty="0"/>
+              <a:t>Azure Pass</a:t>
+            </a:r>
+          </a:p>
+          <a:p>
+            <a:pPr lvl="1"/>
+            <a:r>
+              <a:rPr lang="en-US" dirty="0"/>
+              <a:t>Take a look at your Azure Pass guide</a:t>
+            </a:r>
+          </a:p>
+          <a:p>
+            <a:pPr lvl="1"/>
+            <a:r>
+              <a:rPr lang="en-US" dirty="0"/>
+              <a:t>Log into Portal</a:t>
+            </a:r>
+          </a:p>
+          <a:p>
+            <a:pPr lvl="1"/>
+            <a:r>
+              <a:rPr lang="en-US" dirty="0"/>
+              <a:t>Visual Studio: Don’t have it? Deploy a VM!</a:t>
+            </a:r>
+          </a:p>
+          <a:p>
+            <a:r>
+              <a:rPr lang="en-US" dirty="0"/>
+              <a:t>Code</a:t>
+            </a:r>
+          </a:p>
+          <a:p>
+            <a:pPr lvl="1"/>
+            <a:r>
+              <a:rPr lang="en-US" dirty="0"/>
+              <a:t>Go to our GitHub Repo: </a:t>
+            </a:r>
+            <a:r>
+              <a:rPr lang="en-US" dirty="0">
+                <a:hlinkClick r:id="rId3"/>
+              </a:rPr>
+              <a:t>https://github.com/noodlefrenzy/CognitiveServicesTutorial</a:t>
+            </a:r>
+            <a:endParaRPr lang="en-US" dirty="0"/>
+          </a:p>
+          <a:p>
+            <a:pPr lvl="1"/>
+            <a:r>
+              <a:rPr lang="en-US" dirty="0"/>
+              <a:t>Clone Locally</a:t>
+            </a:r>
+          </a:p>
+          <a:p>
+            <a:pPr lvl="1"/>
+            <a:r>
+              <a:rPr lang="en-US" dirty="0"/>
+              <a:t>Load up LabManual.md</a:t>
+            </a:r>
+          </a:p>
+          <a:p>
+            <a:pPr lvl="1"/>
+            <a:r>
+              <a:rPr lang="en-US" dirty="0"/>
+              <a:t>Code for all tracks is available at: </a:t>
+            </a:r>
+            <a:r>
+              <a:rPr lang="en-US" dirty="0">
+                <a:hlinkClick r:id="rId4"/>
+              </a:rPr>
+              <a:t>https://github.com/Microsoft/AI-Immersion-Workshop</a:t>
+            </a:r>
+            <a:r>
+              <a:rPr lang="en-US" dirty="0"/>
+              <a:t> </a:t>
+            </a:r>
+          </a:p>
+          <a:p>
+            <a:pPr lvl="1"/>
+            <a:endParaRPr lang="en-US" dirty="0"/>
+          </a:p>
+        </p:txBody>
+      </p:sp>
+    </p:spTree>
+    <p:extLst>
+      <p:ext uri="{BB962C8B-B14F-4D97-AF65-F5344CB8AC3E}">
+        <p14:creationId xmlns:p14="http://schemas.microsoft.com/office/powerpoint/2010/main" val="2033139301"/>
+      </p:ext>
+    </p:extLst>
+  </p:cSld>
+  <p:clrMapOvr>
+    <a:masterClrMapping/>
+  </p:clrMapOvr>
+  <mc:AlternateContent xmlns:mc="http://schemas.openxmlformats.org/markup-compatibility/2006" xmlns:p14="http://schemas.microsoft.com/office/powerpoint/2010/main">
+    <mc:Choice Requires="p14">
+      <p:transition spd="med" p14:dur="700">
+        <p:fade/>
+      </p:transition>
+    </mc:Choice>
+    <mc:Fallback xmlns="">
+      <p:transition spd="med">
+        <p:fade/>
+      </p:transition>
+    </mc:Fallback>
+  </mc:AlternateContent>
+</p:sld>
+</file>
+
 <file path=ppt/slides/slide2.xml><?xml version="1.0" encoding="utf-8"?>
 <p:sld xmlns:a="http://schemas.openxmlformats.org/drawingml/2006/main" xmlns:r="http://schemas.openxmlformats.org/officeDocument/2006/relationships" xmlns:p="http://schemas.openxmlformats.org/presentationml/2006/main">
   <p:cSld>
@@ -30322,12 +30672,9 @@
 </file>
 
 <file path=customXml/item1.xml><?xml version="1.0" encoding="utf-8"?>
-<?mso-contentType ?>
-<FormTemplates xmlns="http://schemas.microsoft.com/sharepoint/v3/contenttype/forms">
-  <Display>DocumentLibraryForm</Display>
-  <Edit>DocumentLibraryForm</Edit>
-  <New>DocumentLibraryForm</New>
-</FormTemplates>
+<p:properties xmlns:p="http://schemas.microsoft.com/office/2006/metadata/properties" xmlns:xsi="http://www.w3.org/2001/XMLSchema-instance" xmlns:pc="http://schemas.microsoft.com/office/infopath/2007/PartnerControls">
+  <documentManagement/>
+</p:properties>
 </file>
 
 <file path=customXml/item2.xml><?xml version="1.0" encoding="utf-8"?>
@@ -30485,15 +30832,26 @@
 </file>
 
 <file path=customXml/item3.xml><?xml version="1.0" encoding="utf-8"?>
-<p:properties xmlns:p="http://schemas.microsoft.com/office/2006/metadata/properties" xmlns:xsi="http://www.w3.org/2001/XMLSchema-instance" xmlns:pc="http://schemas.microsoft.com/office/infopath/2007/PartnerControls">
-  <documentManagement/>
-</p:properties>
+<?mso-contentType ?>
+<FormTemplates xmlns="http://schemas.microsoft.com/sharepoint/v3/contenttype/forms">
+  <Display>DocumentLibraryForm</Display>
+  <Edit>DocumentLibraryForm</Edit>
+  <New>DocumentLibraryForm</New>
+</FormTemplates>
 </file>
 
 <file path=customXml/itemProps1.xml><?xml version="1.0" encoding="utf-8"?>
-<ds:datastoreItem xmlns:ds="http://schemas.openxmlformats.org/officeDocument/2006/customXml" ds:itemID="{758FDAC0-319D-4A54-8D8E-1D42CB1F8004}">
+<ds:datastoreItem xmlns:ds="http://schemas.openxmlformats.org/officeDocument/2006/customXml" ds:itemID="{F990F116-B58F-4255-B05B-DA3808E0E5C6}">
   <ds:schemaRefs>
-    <ds:schemaRef ds:uri="http://schemas.microsoft.com/sharepoint/v3/contenttype/forms"/>
+    <ds:schemaRef ds:uri="http://purl.org/dc/elements/1.1/"/>
+    <ds:schemaRef ds:uri="http://schemas.microsoft.com/office/2006/documentManagement/types"/>
+    <ds:schemaRef ds:uri="http://schemas.microsoft.com/office/infopath/2007/PartnerControls"/>
+    <ds:schemaRef ds:uri="http://purl.org/dc/dcmitype/"/>
+    <ds:schemaRef ds:uri="http://www.w3.org/XML/1998/namespace"/>
+    <ds:schemaRef ds:uri="http://schemas.microsoft.com/office/2006/metadata/properties"/>
+    <ds:schemaRef ds:uri="http://schemas.openxmlformats.org/package/2006/metadata/core-properties"/>
+    <ds:schemaRef ds:uri="630a2e83-186a-4a0f-ab27-bee8a8096abc"/>
+    <ds:schemaRef ds:uri="http://purl.org/dc/terms/"/>
   </ds:schemaRefs>
 </ds:datastoreItem>
 </file>
@@ -30517,17 +30875,9 @@
 </file>
 
 <file path=customXml/itemProps3.xml><?xml version="1.0" encoding="utf-8"?>
-<ds:datastoreItem xmlns:ds="http://schemas.openxmlformats.org/officeDocument/2006/customXml" ds:itemID="{F990F116-B58F-4255-B05B-DA3808E0E5C6}">
+<ds:datastoreItem xmlns:ds="http://schemas.openxmlformats.org/officeDocument/2006/customXml" ds:itemID="{758FDAC0-319D-4A54-8D8E-1D42CB1F8004}">
   <ds:schemaRefs>
-    <ds:schemaRef ds:uri="http://purl.org/dc/elements/1.1/"/>
-    <ds:schemaRef ds:uri="http://schemas.microsoft.com/office/2006/documentManagement/types"/>
-    <ds:schemaRef ds:uri="http://schemas.microsoft.com/office/infopath/2007/PartnerControls"/>
-    <ds:schemaRef ds:uri="http://purl.org/dc/dcmitype/"/>
-    <ds:schemaRef ds:uri="http://www.w3.org/XML/1998/namespace"/>
-    <ds:schemaRef ds:uri="http://schemas.microsoft.com/office/2006/metadata/properties"/>
-    <ds:schemaRef ds:uri="http://schemas.openxmlformats.org/package/2006/metadata/core-properties"/>
-    <ds:schemaRef ds:uri="630a2e83-186a-4a0f-ab27-bee8a8096abc"/>
-    <ds:schemaRef ds:uri="http://purl.org/dc/terms/"/>
+    <ds:schemaRef ds:uri="http://schemas.microsoft.com/sharepoint/v3/contenttype/forms"/>
   </ds:schemaRefs>
 </ds:datastoreItem>
 </file>
</xml_diff>

<commit_message>
Adding links to intelligent kiosk, cog services trial page, docdb sql playground
</commit_message>
<xml_diff>
--- a/Presentations/AI_Immersion_Phase_1_DocumentDB.pptx
+++ b/Presentations/AI_Immersion_Phase_1_DocumentDB.pptx
@@ -1305,7 +1305,7 @@
           <a:p>
             <a:fld id="{5A70A388-5CB4-42F2-85B9-1AE1F63398FA}" type="datetime8">
               <a:rPr lang="en-US" smtClean="0"/>
-              <a:t>5/9/2017 9:19 AM</a:t>
+              <a:t>5/9/2017 9:40 AM</a:t>
             </a:fld>
             <a:endParaRPr lang="en-US" dirty="0"/>
           </a:p>
@@ -21365,8 +21365,8 @@
         </p:nvSpPr>
         <p:spPr>
           <a:xfrm>
-            <a:off x="274702" y="1058862"/>
-            <a:ext cx="11888787" cy="5860066"/>
+            <a:off x="274702" y="906462"/>
+            <a:ext cx="11888787" cy="6469463"/>
           </a:xfrm>
         </p:spPr>
         <p:txBody>
@@ -21423,27 +21423,51 @@
             <a:pPr lvl="1"/>
             <a:r>
               <a:rPr lang="en-US" dirty="0"/>
-              <a:t>Clone Locally</a:t>
-            </a:r>
-          </a:p>
-          <a:p>
-            <a:pPr lvl="1"/>
-            <a:r>
-              <a:rPr lang="en-US" dirty="0"/>
-              <a:t>Load up LabManual.md</a:t>
-            </a:r>
-          </a:p>
-          <a:p>
-            <a:pPr lvl="1"/>
-            <a:r>
-              <a:rPr lang="en-US" dirty="0"/>
-              <a:t>Code for all tracks is available at: </a:t>
+              <a:t>Intelligent Kiosk: </a:t>
             </a:r>
             <a:r>
               <a:rPr lang="en-US" dirty="0">
                 <a:hlinkClick r:id="rId4"/>
               </a:rPr>
-              <a:t>https://github.com/Microsoft/AI-Immersion-Workshop</a:t>
+              <a:t>https://github.com/Microsoft/Cognitive-Samples-IntelligentKiosk</a:t>
+            </a:r>
+            <a:endParaRPr lang="en-US" dirty="0"/>
+          </a:p>
+          <a:p>
+            <a:r>
+              <a:rPr lang="en-US" dirty="0"/>
+              <a:t>Playground</a:t>
+            </a:r>
+          </a:p>
+          <a:p>
+            <a:pPr lvl="1"/>
+            <a:r>
+              <a:rPr lang="en-US" dirty="0"/>
+              <a:t>Cognitive: </a:t>
+            </a:r>
+            <a:r>
+              <a:rPr lang="en-US" dirty="0">
+                <a:hlinkClick r:id="rId5"/>
+              </a:rPr>
+              <a:t>https://azure.microsoft.com/en-us/services/cognitive-services/</a:t>
+            </a:r>
+            <a:endParaRPr lang="en-US" dirty="0"/>
+          </a:p>
+          <a:p>
+            <a:pPr lvl="1"/>
+            <a:r>
+              <a:rPr lang="en-US" dirty="0" err="1"/>
+              <a:t>DocumentDB</a:t>
+            </a:r>
+            <a:r>
+              <a:rPr lang="en-US" dirty="0"/>
+              <a:t>: </a:t>
+            </a:r>
+            <a:r>
+              <a:rPr lang="en-US" dirty="0">
+                <a:hlinkClick r:id="rId6"/>
+              </a:rPr>
+              <a:t>https://www.documentdb.com/sql/demo</a:t>
             </a:r>
             <a:r>
               <a:rPr lang="en-US" dirty="0"/>

</xml_diff>